<commit_message>
added several changes... to presentation and for presentation material
</commit_message>
<xml_diff>
--- a/Intro to Web Development Part 3 CSS.pptx
+++ b/Intro to Web Development Part 3 CSS.pptx
@@ -217,7 +217,8 @@
           <a:p>
             <a:fld id="{D1D57645-FFCD-449A-BB23-5EA1509828F4}" type="datetimeFigureOut">
               <a:rPr lang="en-US" smtClean="0"/>
-              <a:t>7/1/2012</a:t>
+              <a:pPr/>
+              <a:t>7/3/2012</a:t>
             </a:fld>
             <a:endParaRPr lang="en-US"/>
           </a:p>
@@ -283,6 +284,7 @@
           <a:p>
             <a:fld id="{E5914020-6910-41C0-A069-FC086DB6EFA5}" type="slidenum">
               <a:rPr lang="en-US" smtClean="0"/>
+              <a:pPr/>
               <a:t>‹#›</a:t>
             </a:fld>
             <a:endParaRPr lang="en-US"/>
@@ -377,7 +379,8 @@
           <a:p>
             <a:fld id="{3DBF5F01-9883-438B-B6D0-73DBD5B9823F}" type="datetimeFigureOut">
               <a:rPr lang="en-US" smtClean="0"/>
-              <a:t>7/1/2012</a:t>
+              <a:pPr/>
+              <a:t>7/3/2012</a:t>
             </a:fld>
             <a:endParaRPr lang="en-US"/>
           </a:p>
@@ -538,6 +541,7 @@
           <a:p>
             <a:fld id="{6DE71287-60DF-4FC1-9F6F-3108B991C5CE}" type="slidenum">
               <a:rPr lang="en-US" smtClean="0"/>
+              <a:pPr/>
               <a:t>‹#›</a:t>
             </a:fld>
             <a:endParaRPr lang="en-US"/>
@@ -776,7 +780,8 @@
           <a:p>
             <a:fld id="{A57BAD35-6B84-4191-B3DC-7A403A6A0CC3}" type="datetime1">
               <a:rPr lang="en-US" smtClean="0"/>
-              <a:t>7/1/2012</a:t>
+              <a:pPr/>
+              <a:t>7/3/2012</a:t>
             </a:fld>
             <a:endParaRPr lang="en-US"/>
           </a:p>
@@ -1090,7 +1095,8 @@
           <a:p>
             <a:fld id="{3A050941-FA83-4211-A590-AC0CE56A8764}" type="datetime1">
               <a:rPr lang="en-US" smtClean="0"/>
-              <a:t>7/1/2012</a:t>
+              <a:pPr/>
+              <a:t>7/3/2012</a:t>
             </a:fld>
             <a:endParaRPr lang="en-US"/>
           </a:p>
@@ -1276,7 +1282,8 @@
           <a:p>
             <a:fld id="{FEE52DFA-80C0-47DB-9BD9-1D65CB6CDA24}" type="datetime1">
               <a:rPr lang="en-US" smtClean="0"/>
-              <a:t>7/1/2012</a:t>
+              <a:pPr/>
+              <a:t>7/3/2012</a:t>
             </a:fld>
             <a:endParaRPr lang="en-US"/>
           </a:p>
@@ -1452,7 +1459,8 @@
           <a:p>
             <a:fld id="{C2F50358-D16D-4C1E-B4FA-5684242D23EC}" type="datetime1">
               <a:rPr lang="en-US" smtClean="0"/>
-              <a:t>7/1/2012</a:t>
+              <a:pPr/>
+              <a:t>7/3/2012</a:t>
             </a:fld>
             <a:endParaRPr lang="en-US"/>
           </a:p>
@@ -1721,7 +1729,8 @@
           <a:p>
             <a:fld id="{CBDDB5AB-3AEE-44CE-9007-9F1799B280DC}" type="datetime1">
               <a:rPr lang="en-US" smtClean="0"/>
-              <a:t>7/1/2012</a:t>
+              <a:pPr/>
+              <a:t>7/3/2012</a:t>
             </a:fld>
             <a:endParaRPr lang="en-US"/>
           </a:p>
@@ -2190,7 +2199,8 @@
           <a:p>
             <a:fld id="{D3203901-A8D7-4787-8A59-7548459B0167}" type="datetime1">
               <a:rPr lang="en-US" smtClean="0"/>
-              <a:t>7/1/2012</a:t>
+              <a:pPr/>
+              <a:t>7/3/2012</a:t>
             </a:fld>
             <a:endParaRPr lang="en-US"/>
           </a:p>
@@ -2680,7 +2690,8 @@
           <a:p>
             <a:fld id="{7918E94E-D541-420D-A800-FD77FBF7DA22}" type="datetime1">
               <a:rPr lang="en-US" smtClean="0"/>
-              <a:t>7/1/2012</a:t>
+              <a:pPr/>
+              <a:t>7/3/2012</a:t>
             </a:fld>
             <a:endParaRPr lang="en-US"/>
           </a:p>
@@ -2807,7 +2818,8 @@
           <a:p>
             <a:fld id="{4F6AD9DB-6294-4080-B799-E3AAD55EC433}" type="datetime1">
               <a:rPr lang="en-US" smtClean="0"/>
-              <a:t>7/1/2012</a:t>
+              <a:pPr/>
+              <a:t>7/3/2012</a:t>
             </a:fld>
             <a:endParaRPr lang="en-US"/>
           </a:p>
@@ -2952,7 +2964,8 @@
           <a:p>
             <a:fld id="{BB50B515-1A03-4B7B-9677-075026F277E2}" type="datetime1">
               <a:rPr lang="en-US" smtClean="0"/>
-              <a:t>7/1/2012</a:t>
+              <a:pPr/>
+              <a:t>7/3/2012</a:t>
             </a:fld>
             <a:endParaRPr lang="en-US"/>
           </a:p>
@@ -3275,7 +3288,8 @@
           <a:p>
             <a:fld id="{BB176034-9467-42CE-BFB4-763887316EF3}" type="datetime1">
               <a:rPr lang="en-US" smtClean="0"/>
-              <a:t>7/1/2012</a:t>
+              <a:pPr/>
+              <a:t>7/3/2012</a:t>
             </a:fld>
             <a:endParaRPr lang="en-US"/>
           </a:p>
@@ -3410,7 +3424,8 @@
           <a:p>
             <a:fld id="{49E44895-E262-425D-912F-9A1492637C2E}" type="datetime1">
               <a:rPr lang="en-US" smtClean="0"/>
-              <a:t>7/1/2012</a:t>
+              <a:pPr/>
+              <a:t>7/3/2012</a:t>
             </a:fld>
             <a:endParaRPr lang="en-US"/>
           </a:p>
@@ -4192,7 +4207,8 @@
           <a:p>
             <a:fld id="{23F403FB-53A5-4106-8144-8A9C4E2CDCDB}" type="datetime1">
               <a:rPr lang="en-US" smtClean="0"/>
-              <a:t>7/1/2012</a:t>
+              <a:pPr/>
+              <a:t>7/3/2012</a:t>
             </a:fld>
             <a:endParaRPr lang="en-US"/>
           </a:p>
@@ -5140,17 +5156,60 @@
                 <a:latin typeface="Courier New" pitchFamily="49" charset="0"/>
                 <a:cs typeface="Courier New" pitchFamily="49" charset="0"/>
               </a:rPr>
+              <a:t>            }</a:t>
+            </a:r>
+          </a:p>
+          <a:p>
+            <a:pPr>
+              <a:buNone/>
+            </a:pPr>
+            <a:r>
+              <a:rPr lang="en-US" sz="1600" dirty="0" smtClean="0">
+                <a:latin typeface="Courier New" pitchFamily="49" charset="0"/>
+                <a:cs typeface="Courier New" pitchFamily="49" charset="0"/>
+              </a:rPr>
+              <a:t>             </a:t>
+            </a:r>
+          </a:p>
+          <a:p>
+            <a:pPr>
+              <a:buNone/>
+            </a:pPr>
+            <a:r>
+              <a:rPr lang="en-US" sz="1600" dirty="0" smtClean="0">
+                <a:latin typeface="Courier New" pitchFamily="49" charset="0"/>
+                <a:cs typeface="Courier New" pitchFamily="49" charset="0"/>
+              </a:rPr>
+              <a:t>            /*Notice that for class we use a dot prefix (.)*/</a:t>
+            </a:r>
+          </a:p>
+          <a:p>
+            <a:pPr>
+              <a:buNone/>
+            </a:pPr>
+            <a:r>
+              <a:rPr lang="en-US" sz="1600" dirty="0" smtClean="0">
+                <a:latin typeface="Courier New" pitchFamily="49" charset="0"/>
+                <a:cs typeface="Courier New" pitchFamily="49" charset="0"/>
+              </a:rPr>
               <a:t>            </a:t>
             </a:r>
             <a:r>
+              <a:rPr lang="en-US" sz="1600" b="1" dirty="0" smtClean="0">
+                <a:solidFill>
+                  <a:srgbClr val="FF0000"/>
+                </a:solidFill>
+                <a:latin typeface="Courier New" pitchFamily="49" charset="0"/>
+                <a:cs typeface="Courier New" pitchFamily="49" charset="0"/>
+              </a:rPr>
+              <a:t>.product-description</a:t>
+            </a:r>
+            <a:r>
               <a:rPr lang="en-US" sz="1600" dirty="0" smtClean="0">
-                <a:solidFill>
-                  <a:srgbClr val="7030A0"/>
-                </a:solidFill>
-                <a:latin typeface="Courier New" pitchFamily="49" charset="0"/>
-                <a:cs typeface="Courier New" pitchFamily="49" charset="0"/>
-              </a:rPr>
-              <a:t>}</a:t>
+                <a:latin typeface="Courier New" pitchFamily="49" charset="0"/>
+                <a:cs typeface="Courier New" pitchFamily="49" charset="0"/>
+              </a:rPr>
+              <a:t>{</a:t>
             </a:r>
           </a:p>
           <a:p>
@@ -5162,14 +5221,19 @@
                 <a:latin typeface="Courier New" pitchFamily="49" charset="0"/>
                 <a:cs typeface="Courier New" pitchFamily="49" charset="0"/>
               </a:rPr>
-              <a:t> </a:t>
-            </a:r>
+              <a:t>                color: #00FF00;</a:t>
+            </a:r>
+          </a:p>
+          <a:p>
+            <a:pPr>
+              <a:buNone/>
+            </a:pPr>
             <a:r>
               <a:rPr lang="en-US" sz="1600" dirty="0" smtClean="0">
                 <a:latin typeface="Courier New" pitchFamily="49" charset="0"/>
                 <a:cs typeface="Courier New" pitchFamily="49" charset="0"/>
               </a:rPr>
-              <a:t>            </a:t>
+              <a:t>                background-color: #CCCCCC; </a:t>
             </a:r>
           </a:p>
           <a:p>
@@ -5181,19 +5245,20 @@
                 <a:latin typeface="Courier New" pitchFamily="49" charset="0"/>
                 <a:cs typeface="Courier New" pitchFamily="49" charset="0"/>
               </a:rPr>
-              <a:t> </a:t>
-            </a:r>
+              <a:t>                font-size: 2em;</a:t>
+            </a:r>
+          </a:p>
+          <a:p>
+            <a:pPr>
+              <a:buNone/>
+            </a:pPr>
             <a:r>
               <a:rPr lang="en-US" sz="1600" dirty="0" smtClean="0">
                 <a:latin typeface="Courier New" pitchFamily="49" charset="0"/>
                 <a:cs typeface="Courier New" pitchFamily="49" charset="0"/>
               </a:rPr>
-              <a:t>           /*Notice that for class we use a dot prefix (.)*/</a:t>
-            </a:r>
-            <a:endParaRPr lang="en-US" sz="1600" dirty="0" smtClean="0">
-              <a:latin typeface="Courier New" pitchFamily="49" charset="0"/>
-              <a:cs typeface="Courier New" pitchFamily="49" charset="0"/>
-            </a:endParaRPr>
+              <a:t>           }</a:t>
+            </a:r>
           </a:p>
           <a:p>
             <a:pPr>
@@ -5204,98 +5269,7 @@
                 <a:latin typeface="Courier New" pitchFamily="49" charset="0"/>
                 <a:cs typeface="Courier New" pitchFamily="49" charset="0"/>
               </a:rPr>
-              <a:t>            </a:t>
-            </a:r>
-            <a:r>
-              <a:rPr lang="en-US" sz="1600" b="1" dirty="0" smtClean="0">
-                <a:solidFill>
-                  <a:srgbClr val="FF0000"/>
-                </a:solidFill>
-                <a:latin typeface="Courier New" pitchFamily="49" charset="0"/>
-                <a:cs typeface="Courier New" pitchFamily="49" charset="0"/>
-              </a:rPr>
-              <a:t>.product-description</a:t>
-            </a:r>
-            <a:r>
-              <a:rPr lang="en-US" sz="1600" dirty="0" smtClean="0">
-                <a:latin typeface="Courier New" pitchFamily="49" charset="0"/>
-                <a:cs typeface="Courier New" pitchFamily="49" charset="0"/>
-              </a:rPr>
-              <a:t>{</a:t>
-            </a:r>
-          </a:p>
-          <a:p>
-            <a:pPr>
-              <a:buNone/>
-            </a:pPr>
-            <a:r>
-              <a:rPr lang="en-US" sz="1600" dirty="0" smtClean="0">
-                <a:latin typeface="Courier New" pitchFamily="49" charset="0"/>
-                <a:cs typeface="Courier New" pitchFamily="49" charset="0"/>
-              </a:rPr>
-              <a:t>                color: #00FF00;</a:t>
-            </a:r>
-          </a:p>
-          <a:p>
-            <a:pPr>
-              <a:buNone/>
-            </a:pPr>
-            <a:r>
-              <a:rPr lang="en-US" sz="1600" dirty="0" smtClean="0">
-                <a:latin typeface="Courier New" pitchFamily="49" charset="0"/>
-                <a:cs typeface="Courier New" pitchFamily="49" charset="0"/>
-              </a:rPr>
-              <a:t>                background-color: #CCCCCC; </a:t>
-            </a:r>
-          </a:p>
-          <a:p>
-            <a:pPr>
-              <a:buNone/>
-            </a:pPr>
-            <a:r>
-              <a:rPr lang="en-US" sz="1600" dirty="0" smtClean="0">
-                <a:latin typeface="Courier New" pitchFamily="49" charset="0"/>
-                <a:cs typeface="Courier New" pitchFamily="49" charset="0"/>
-              </a:rPr>
-              <a:t>                font-size: 2em;</a:t>
-            </a:r>
-          </a:p>
-          <a:p>
-            <a:pPr>
-              <a:buNone/>
-            </a:pPr>
-            <a:r>
-              <a:rPr lang="en-US" sz="1600" dirty="0" smtClean="0">
-                <a:latin typeface="Courier New" pitchFamily="49" charset="0"/>
-                <a:cs typeface="Courier New" pitchFamily="49" charset="0"/>
-              </a:rPr>
-              <a:t>           }</a:t>
-            </a:r>
-          </a:p>
-          <a:p>
-            <a:pPr>
-              <a:buNone/>
-            </a:pPr>
-            <a:r>
-              <a:rPr lang="en-US" sz="1600" dirty="0" smtClean="0">
-                <a:latin typeface="Courier New" pitchFamily="49" charset="0"/>
-                <a:cs typeface="Courier New" pitchFamily="49" charset="0"/>
-              </a:rPr>
-              <a:t>  &lt;/</a:t>
-            </a:r>
-            <a:r>
-              <a:rPr lang="en-US" sz="1600" dirty="0" smtClean="0">
-                <a:latin typeface="Courier New" pitchFamily="49" charset="0"/>
-                <a:cs typeface="Courier New" pitchFamily="49" charset="0"/>
-              </a:rPr>
-              <a:t>style</a:t>
-            </a:r>
-            <a:r>
-              <a:rPr lang="en-US" sz="1600" dirty="0" smtClean="0">
-                <a:latin typeface="Courier New" pitchFamily="49" charset="0"/>
-                <a:cs typeface="Courier New" pitchFamily="49" charset="0"/>
-              </a:rPr>
-              <a:t>&gt;</a:t>
+              <a:t>  &lt;/style&gt;</a:t>
             </a:r>
           </a:p>
           <a:p>
@@ -5316,21 +5290,29 @@
                 <a:latin typeface="Courier New" pitchFamily="49" charset="0"/>
                 <a:cs typeface="Courier New" pitchFamily="49" charset="0"/>
               </a:rPr>
-              <a:t> </a:t>
-            </a:r>
+              <a:t>        This is some text outside of a paragraph.</a:t>
+            </a:r>
+          </a:p>
+          <a:p>
+            <a:pPr>
+              <a:buNone/>
+            </a:pPr>
             <a:r>
               <a:rPr lang="en-US" sz="1600" dirty="0" smtClean="0">
                 <a:latin typeface="Courier New" pitchFamily="49" charset="0"/>
                 <a:cs typeface="Courier New" pitchFamily="49" charset="0"/>
               </a:rPr>
-              <a:t>       This </a:t>
+              <a:t>        </a:t>
             </a:r>
             <a:r>
               <a:rPr lang="en-US" sz="1600" dirty="0" smtClean="0">
-                <a:latin typeface="Courier New" pitchFamily="49" charset="0"/>
-                <a:cs typeface="Courier New" pitchFamily="49" charset="0"/>
-              </a:rPr>
-              <a:t>is some text outside of a paragraph.</a:t>
+                <a:solidFill>
+                  <a:srgbClr val="7030A0"/>
+                </a:solidFill>
+                <a:latin typeface="Courier New" pitchFamily="49" charset="0"/>
+                <a:cs typeface="Courier New" pitchFamily="49" charset="0"/>
+              </a:rPr>
+              <a:t>&lt;p&gt;</a:t>
             </a:r>
           </a:p>
           <a:p>
@@ -5339,11 +5321,19 @@
             </a:pPr>
             <a:r>
               <a:rPr lang="en-US" sz="1600" dirty="0" smtClean="0">
-                <a:latin typeface="Courier New" pitchFamily="49" charset="0"/>
-                <a:cs typeface="Courier New" pitchFamily="49" charset="0"/>
-              </a:rPr>
-              <a:t>        </a:t>
-            </a:r>
+                <a:solidFill>
+                  <a:srgbClr val="7030A0"/>
+                </a:solidFill>
+                <a:latin typeface="Courier New" pitchFamily="49" charset="0"/>
+                <a:cs typeface="Courier New" pitchFamily="49" charset="0"/>
+              </a:rPr>
+              <a:t>            This is some text within a styled paragraph.</a:t>
+            </a:r>
+          </a:p>
+          <a:p>
+            <a:pPr>
+              <a:buNone/>
+            </a:pPr>
             <a:r>
               <a:rPr lang="en-US" sz="1600" dirty="0" smtClean="0">
                 <a:solidFill>
@@ -5352,7 +5342,7 @@
                 <a:latin typeface="Courier New" pitchFamily="49" charset="0"/>
                 <a:cs typeface="Courier New" pitchFamily="49" charset="0"/>
               </a:rPr>
-              <a:t>&lt;p&gt;</a:t>
+              <a:t>        &lt;/p&gt;</a:t>
             </a:r>
           </a:p>
           <a:p>
@@ -5361,13 +5351,27 @@
             </a:pPr>
             <a:r>
               <a:rPr lang="en-US" sz="1600" dirty="0" smtClean="0">
-                <a:solidFill>
-                  <a:srgbClr val="7030A0"/>
-                </a:solidFill>
-                <a:latin typeface="Courier New" pitchFamily="49" charset="0"/>
-                <a:cs typeface="Courier New" pitchFamily="49" charset="0"/>
-              </a:rPr>
-              <a:t>            This is some text within a styled paragraph.</a:t>
+                <a:latin typeface="Courier New" pitchFamily="49" charset="0"/>
+                <a:cs typeface="Courier New" pitchFamily="49" charset="0"/>
+              </a:rPr>
+              <a:t>        &lt;p </a:t>
+            </a:r>
+            <a:r>
+              <a:rPr lang="en-US" sz="1600" b="1" dirty="0" smtClean="0">
+                <a:solidFill>
+                  <a:srgbClr val="FF0000"/>
+                </a:solidFill>
+                <a:latin typeface="Courier New" pitchFamily="49" charset="0"/>
+                <a:cs typeface="Courier New" pitchFamily="49" charset="0"/>
+              </a:rPr>
+              <a:t>class="product-description"</a:t>
+            </a:r>
+            <a:r>
+              <a:rPr lang="en-US" sz="1600" dirty="0" smtClean="0">
+                <a:latin typeface="Courier New" pitchFamily="49" charset="0"/>
+                <a:cs typeface="Courier New" pitchFamily="49" charset="0"/>
+              </a:rPr>
+              <a:t>&gt;</a:t>
             </a:r>
           </a:p>
           <a:p>
@@ -5376,111 +5380,35 @@
             </a:pPr>
             <a:r>
               <a:rPr lang="en-US" sz="1600" dirty="0" smtClean="0">
-                <a:solidFill>
-                  <a:srgbClr val="7030A0"/>
-                </a:solidFill>
+                <a:latin typeface="Courier New" pitchFamily="49" charset="0"/>
+                <a:cs typeface="Courier New" pitchFamily="49" charset="0"/>
+              </a:rPr>
+              <a:t>            This is a product description. Notice how this product</a:t>
+            </a:r>
+          </a:p>
+          <a:p>
+            <a:pPr>
+              <a:buNone/>
+            </a:pPr>
+            <a:r>
+              <a:rPr lang="en-US" sz="1600" dirty="0" smtClean="0">
+                <a:latin typeface="Courier New" pitchFamily="49" charset="0"/>
+                <a:cs typeface="Courier New" pitchFamily="49" charset="0"/>
+              </a:rPr>
+              <a:t>            has background and it has a different font color.</a:t>
+            </a:r>
+          </a:p>
+          <a:p>
+            <a:pPr>
+              <a:buNone/>
+            </a:pPr>
+            <a:r>
+              <a:rPr lang="en-US" sz="1600" dirty="0" smtClean="0">
                 <a:latin typeface="Courier New" pitchFamily="49" charset="0"/>
                 <a:cs typeface="Courier New" pitchFamily="49" charset="0"/>
               </a:rPr>
               <a:t>        &lt;/p&gt;</a:t>
             </a:r>
-          </a:p>
-          <a:p>
-            <a:pPr>
-              <a:buNone/>
-            </a:pPr>
-            <a:r>
-              <a:rPr lang="en-US" sz="1600" dirty="0" smtClean="0">
-                <a:latin typeface="Courier New" pitchFamily="49" charset="0"/>
-                <a:cs typeface="Courier New" pitchFamily="49" charset="0"/>
-              </a:rPr>
-              <a:t>        &lt;p </a:t>
-            </a:r>
-            <a:r>
-              <a:rPr lang="en-US" sz="1600" b="1" dirty="0" smtClean="0">
-                <a:solidFill>
-                  <a:srgbClr val="FF0000"/>
-                </a:solidFill>
-                <a:latin typeface="Courier New" pitchFamily="49" charset="0"/>
-                <a:cs typeface="Courier New" pitchFamily="49" charset="0"/>
-              </a:rPr>
-              <a:t>class="product-description"</a:t>
-            </a:r>
-            <a:r>
-              <a:rPr lang="en-US" sz="1600" dirty="0" smtClean="0">
-                <a:latin typeface="Courier New" pitchFamily="49" charset="0"/>
-                <a:cs typeface="Courier New" pitchFamily="49" charset="0"/>
-              </a:rPr>
-              <a:t>&gt;</a:t>
-            </a:r>
-          </a:p>
-          <a:p>
-            <a:pPr>
-              <a:buNone/>
-            </a:pPr>
-            <a:r>
-              <a:rPr lang="en-US" sz="1600" dirty="0" smtClean="0">
-                <a:latin typeface="Courier New" pitchFamily="49" charset="0"/>
-                <a:cs typeface="Courier New" pitchFamily="49" charset="0"/>
-              </a:rPr>
-              <a:t>            This is a product description. Notice how this </a:t>
-            </a:r>
-            <a:r>
-              <a:rPr lang="en-US" sz="1600" dirty="0" smtClean="0">
-                <a:latin typeface="Courier New" pitchFamily="49" charset="0"/>
-                <a:cs typeface="Courier New" pitchFamily="49" charset="0"/>
-              </a:rPr>
-              <a:t>product</a:t>
-            </a:r>
-          </a:p>
-          <a:p>
-            <a:pPr>
-              <a:buNone/>
-            </a:pPr>
-            <a:r>
-              <a:rPr lang="en-US" sz="1600" dirty="0" smtClean="0">
-                <a:latin typeface="Courier New" pitchFamily="49" charset="0"/>
-                <a:cs typeface="Courier New" pitchFamily="49" charset="0"/>
-              </a:rPr>
-              <a:t> </a:t>
-            </a:r>
-            <a:r>
-              <a:rPr lang="en-US" sz="1600" dirty="0" smtClean="0">
-                <a:latin typeface="Courier New" pitchFamily="49" charset="0"/>
-                <a:cs typeface="Courier New" pitchFamily="49" charset="0"/>
-              </a:rPr>
-              <a:t>           has </a:t>
-            </a:r>
-            <a:r>
-              <a:rPr lang="en-US" sz="1600" dirty="0" smtClean="0">
-                <a:latin typeface="Courier New" pitchFamily="49" charset="0"/>
-                <a:cs typeface="Courier New" pitchFamily="49" charset="0"/>
-              </a:rPr>
-              <a:t>background and it has a different font color.</a:t>
-            </a:r>
-          </a:p>
-          <a:p>
-            <a:pPr>
-              <a:buNone/>
-            </a:pPr>
-            <a:r>
-              <a:rPr lang="en-US" sz="1600" dirty="0" smtClean="0">
-                <a:latin typeface="Courier New" pitchFamily="49" charset="0"/>
-                <a:cs typeface="Courier New" pitchFamily="49" charset="0"/>
-              </a:rPr>
-              <a:t>        &lt;/p</a:t>
-            </a:r>
-            <a:r>
-              <a:rPr lang="en-US" sz="1600" dirty="0" smtClean="0">
-                <a:latin typeface="Courier New" pitchFamily="49" charset="0"/>
-                <a:cs typeface="Courier New" pitchFamily="49" charset="0"/>
-              </a:rPr>
-              <a:t>&gt;</a:t>
-            </a:r>
-            <a:endParaRPr lang="en-US" sz="1600" dirty="0" smtClean="0">
-              <a:latin typeface="Courier New" pitchFamily="49" charset="0"/>
-              <a:cs typeface="Courier New" pitchFamily="49" charset="0"/>
-            </a:endParaRPr>
           </a:p>
         </p:txBody>
       </p:sp>
@@ -5647,21 +5575,7 @@
                 <a:latin typeface="Courier New" pitchFamily="49" charset="0"/>
                 <a:cs typeface="Courier New" pitchFamily="49" charset="0"/>
               </a:rPr>
-              <a:t> &lt;/</a:t>
-            </a:r>
-            <a:r>
-              <a:rPr lang="en-US" sz="1600" dirty="0" smtClean="0">
-                <a:latin typeface="Courier New" pitchFamily="49" charset="0"/>
-                <a:cs typeface="Courier New" pitchFamily="49" charset="0"/>
-              </a:rPr>
-              <a:t>style</a:t>
-            </a:r>
-            <a:r>
-              <a:rPr lang="en-US" sz="1600" dirty="0" smtClean="0">
-                <a:latin typeface="Courier New" pitchFamily="49" charset="0"/>
-                <a:cs typeface="Courier New" pitchFamily="49" charset="0"/>
-              </a:rPr>
-              <a:t>&gt;</a:t>
+              <a:t> &lt;/style&gt;</a:t>
             </a:r>
           </a:p>
           <a:p>
@@ -5682,31 +5596,36 @@
                 <a:latin typeface="Courier New" pitchFamily="49" charset="0"/>
                 <a:cs typeface="Courier New" pitchFamily="49" charset="0"/>
               </a:rPr>
-              <a:t>&lt;</a:t>
+              <a:t>&lt;p </a:t>
+            </a:r>
+            <a:r>
+              <a:rPr lang="en-US" sz="1600" b="1" dirty="0" smtClean="0">
+                <a:solidFill>
+                  <a:srgbClr val="FF0000"/>
+                </a:solidFill>
+                <a:latin typeface="Courier New" pitchFamily="49" charset="0"/>
+                <a:cs typeface="Courier New" pitchFamily="49" charset="0"/>
+              </a:rPr>
+              <a:t>id=“sale-item-of-the-week"</a:t>
             </a:r>
             <a:r>
               <a:rPr lang="en-US" sz="1600" dirty="0" smtClean="0">
                 <a:latin typeface="Courier New" pitchFamily="49" charset="0"/>
                 <a:cs typeface="Courier New" pitchFamily="49" charset="0"/>
               </a:rPr>
-              <a:t>p </a:t>
-            </a:r>
-            <a:r>
-              <a:rPr lang="en-US" sz="1600" b="1" dirty="0" smtClean="0">
-                <a:solidFill>
-                  <a:srgbClr val="FF0000"/>
-                </a:solidFill>
-                <a:latin typeface="Courier New" pitchFamily="49" charset="0"/>
-                <a:cs typeface="Courier New" pitchFamily="49" charset="0"/>
-              </a:rPr>
-              <a:t>id=“sale-item-of-the-week"</a:t>
-            </a:r>
+              <a:t>&gt;</a:t>
+            </a:r>
+          </a:p>
+          <a:p>
+            <a:pPr>
+              <a:buNone/>
+            </a:pPr>
             <a:r>
               <a:rPr lang="en-US" sz="1600" dirty="0" smtClean="0">
                 <a:latin typeface="Courier New" pitchFamily="49" charset="0"/>
                 <a:cs typeface="Courier New" pitchFamily="49" charset="0"/>
               </a:rPr>
-              <a:t>&gt;</a:t>
+              <a:t>    This item works as seen on TV. It will go fast so get it while supplies last.</a:t>
             </a:r>
           </a:p>
           <a:p>
@@ -5718,44 +5637,7 @@
                 <a:latin typeface="Courier New" pitchFamily="49" charset="0"/>
                 <a:cs typeface="Courier New" pitchFamily="49" charset="0"/>
               </a:rPr>
-              <a:t> </a:t>
-            </a:r>
-            <a:r>
-              <a:rPr lang="en-US" sz="1600" dirty="0" smtClean="0">
-                <a:latin typeface="Courier New" pitchFamily="49" charset="0"/>
-                <a:cs typeface="Courier New" pitchFamily="49" charset="0"/>
-              </a:rPr>
-              <a:t>   This item works as seen on TV. It will go fast so get it while supplies last.</a:t>
-            </a:r>
-            <a:endParaRPr lang="en-US" sz="1600" dirty="0" smtClean="0">
-              <a:latin typeface="Courier New" pitchFamily="49" charset="0"/>
-              <a:cs typeface="Courier New" pitchFamily="49" charset="0"/>
-            </a:endParaRPr>
-          </a:p>
-          <a:p>
-            <a:pPr>
-              <a:buNone/>
-            </a:pPr>
-            <a:r>
-              <a:rPr lang="en-US" sz="1600" dirty="0" smtClean="0">
-                <a:latin typeface="Courier New" pitchFamily="49" charset="0"/>
-                <a:cs typeface="Courier New" pitchFamily="49" charset="0"/>
-              </a:rPr>
-              <a:t>&lt;/</a:t>
-            </a:r>
-            <a:r>
-              <a:rPr lang="en-US" sz="1600" dirty="0" smtClean="0">
-                <a:latin typeface="Courier New" pitchFamily="49" charset="0"/>
-                <a:cs typeface="Courier New" pitchFamily="49" charset="0"/>
-              </a:rPr>
-              <a:t>p</a:t>
-            </a:r>
-            <a:r>
-              <a:rPr lang="en-US" sz="1600" dirty="0" smtClean="0">
-                <a:latin typeface="Courier New" pitchFamily="49" charset="0"/>
-                <a:cs typeface="Courier New" pitchFamily="49" charset="0"/>
-              </a:rPr>
-              <a:t>&gt;</a:t>
+              <a:t>&lt;/p&gt;</a:t>
             </a:r>
           </a:p>
           <a:p>
@@ -5918,14 +5800,46 @@
                 <a:latin typeface="Courier New" pitchFamily="49" charset="0"/>
                 <a:cs typeface="Courier New" pitchFamily="49" charset="0"/>
               </a:rPr>
-              <a:t>;  </a:t>
-            </a:r>
+              <a:t>;  }</a:t>
+            </a:r>
+          </a:p>
+          <a:p>
+            <a:pPr>
+              <a:buNone/>
+            </a:pPr>
             <a:r>
               <a:rPr lang="en-US" sz="2000" b="1" dirty="0" smtClean="0">
-                <a:latin typeface="Courier New" pitchFamily="49" charset="0"/>
-                <a:cs typeface="Courier New" pitchFamily="49" charset="0"/>
-              </a:rPr>
-              <a:t>}</a:t>
+                <a:solidFill>
+                  <a:srgbClr val="FF0000"/>
+                </a:solidFill>
+                <a:latin typeface="Courier New" pitchFamily="49" charset="0"/>
+                <a:cs typeface="Courier New" pitchFamily="49" charset="0"/>
+              </a:rPr>
+              <a:t>#item-of-the-week</a:t>
+            </a:r>
+            <a:r>
+              <a:rPr lang="en-US" sz="2000" b="1" dirty="0" smtClean="0">
+                <a:latin typeface="Courier New" pitchFamily="49" charset="0"/>
+                <a:cs typeface="Courier New" pitchFamily="49" charset="0"/>
+              </a:rPr>
+              <a:t>{ color: </a:t>
+            </a:r>
+            <a:r>
+              <a:rPr lang="en-US" sz="2000" b="1" dirty="0" smtClean="0">
+                <a:solidFill>
+                  <a:srgbClr val="00B050"/>
+                </a:solidFill>
+                <a:latin typeface="Courier New" pitchFamily="49" charset="0"/>
+                <a:cs typeface="Courier New" pitchFamily="49" charset="0"/>
+              </a:rPr>
+              <a:t>green</a:t>
+            </a:r>
+            <a:r>
+              <a:rPr lang="en-US" sz="2000" b="1" dirty="0" smtClean="0">
+                <a:latin typeface="Courier New" pitchFamily="49" charset="0"/>
+                <a:cs typeface="Courier New" pitchFamily="49" charset="0"/>
+              </a:rPr>
+              <a:t>;  }</a:t>
             </a:r>
           </a:p>
           <a:p>
@@ -5940,74 +5854,24 @@
                 <a:latin typeface="Courier New" pitchFamily="49" charset="0"/>
                 <a:cs typeface="Courier New" pitchFamily="49" charset="0"/>
               </a:rPr>
-              <a:t>#item-of-the-week</a:t>
+              <a:t>.</a:t>
+            </a:r>
+            <a:r>
+              <a:rPr lang="en-US" sz="2000" b="1" dirty="0" err="1" smtClean="0">
+                <a:solidFill>
+                  <a:srgbClr val="FF0000"/>
+                </a:solidFill>
+                <a:latin typeface="Courier New" pitchFamily="49" charset="0"/>
+                <a:cs typeface="Courier New" pitchFamily="49" charset="0"/>
+              </a:rPr>
+              <a:t>myclass</a:t>
             </a:r>
             <a:r>
               <a:rPr lang="en-US" sz="2000" b="1" dirty="0" smtClean="0">
                 <a:latin typeface="Courier New" pitchFamily="49" charset="0"/>
                 <a:cs typeface="Courier New" pitchFamily="49" charset="0"/>
               </a:rPr>
-              <a:t>{ color: </a:t>
-            </a:r>
-            <a:r>
-              <a:rPr lang="en-US" sz="2000" b="1" dirty="0" smtClean="0">
-                <a:solidFill>
-                  <a:srgbClr val="00B050"/>
-                </a:solidFill>
-                <a:latin typeface="Courier New" pitchFamily="49" charset="0"/>
-                <a:cs typeface="Courier New" pitchFamily="49" charset="0"/>
-              </a:rPr>
-              <a:t>green</a:t>
-            </a:r>
-            <a:r>
-              <a:rPr lang="en-US" sz="2000" b="1" dirty="0" smtClean="0">
-                <a:latin typeface="Courier New" pitchFamily="49" charset="0"/>
-                <a:cs typeface="Courier New" pitchFamily="49" charset="0"/>
-              </a:rPr>
-              <a:t>;  }</a:t>
-            </a:r>
-            <a:endParaRPr lang="en-US" sz="2000" b="1" dirty="0" smtClean="0">
-              <a:latin typeface="Courier New" pitchFamily="49" charset="0"/>
-              <a:cs typeface="Courier New" pitchFamily="49" charset="0"/>
-            </a:endParaRPr>
-          </a:p>
-          <a:p>
-            <a:pPr>
-              <a:buNone/>
-            </a:pPr>
-            <a:r>
-              <a:rPr lang="en-US" sz="2000" b="1" dirty="0" smtClean="0">
-                <a:solidFill>
-                  <a:srgbClr val="FF0000"/>
-                </a:solidFill>
-                <a:latin typeface="Courier New" pitchFamily="49" charset="0"/>
-                <a:cs typeface="Courier New" pitchFamily="49" charset="0"/>
-              </a:rPr>
-              <a:t>.</a:t>
-            </a:r>
-            <a:r>
-              <a:rPr lang="en-US" sz="2000" b="1" dirty="0" err="1" smtClean="0">
-                <a:solidFill>
-                  <a:srgbClr val="FF0000"/>
-                </a:solidFill>
-                <a:latin typeface="Courier New" pitchFamily="49" charset="0"/>
-                <a:cs typeface="Courier New" pitchFamily="49" charset="0"/>
-              </a:rPr>
-              <a:t>myclass</a:t>
-            </a:r>
-            <a:r>
-              <a:rPr lang="en-US" sz="2000" b="1" dirty="0" smtClean="0">
-                <a:latin typeface="Courier New" pitchFamily="49" charset="0"/>
-                <a:cs typeface="Courier New" pitchFamily="49" charset="0"/>
-              </a:rPr>
-              <a:t>{ color: </a:t>
-            </a:r>
-            <a:r>
-              <a:rPr lang="en-US" sz="2000" b="1" dirty="0" smtClean="0">
-                <a:latin typeface="Courier New" pitchFamily="49" charset="0"/>
-                <a:cs typeface="Courier New" pitchFamily="49" charset="0"/>
-              </a:rPr>
-              <a:t> </a:t>
+              <a:t>{ color:  </a:t>
             </a:r>
             <a:r>
               <a:rPr lang="en-US" sz="2000" b="1" dirty="0" smtClean="0">
@@ -6095,10 +5959,6 @@
               </a:rPr>
               <a:t>”&gt;</a:t>
             </a:r>
-            <a:endParaRPr lang="en-US" sz="2000" b="1" dirty="0" smtClean="0">
-              <a:latin typeface="Courier New" pitchFamily="49" charset="0"/>
-              <a:cs typeface="Courier New" pitchFamily="49" charset="0"/>
-            </a:endParaRPr>
           </a:p>
           <a:p>
             <a:endParaRPr lang="en-US" sz="2400" dirty="0" smtClean="0"/>
@@ -6540,7 +6400,7 @@
         <p:spPr/>
         <p:txBody>
           <a:bodyPr>
-            <a:normAutofit fontScale="92500" lnSpcReduction="10000"/>
+            <a:normAutofit fontScale="92500"/>
           </a:bodyPr>
           <a:lstStyle/>
           <a:p>
@@ -6555,12 +6415,12 @@
               <a:t>Each group of two characters represents the </a:t>
             </a:r>
             <a:r>
-              <a:rPr lang="en-US" dirty="0" err="1" smtClean="0"/>
-              <a:t>the</a:t>
-            </a:r>
-            <a:r>
-              <a:rPr lang="en-US" dirty="0" smtClean="0"/>
-              <a:t> colors Red, Green, Blue(RGB) respectively</a:t>
+              <a:rPr lang="en-US" dirty="0" smtClean="0"/>
+              <a:t>colors </a:t>
+            </a:r>
+            <a:r>
+              <a:rPr lang="en-US" dirty="0" smtClean="0"/>
+              <a:t>Red, Green, Blue(RGB) respectively</a:t>
             </a:r>
           </a:p>
           <a:p>
@@ -6586,7 +6446,6 @@
               <a:rPr lang="en-US" dirty="0" smtClean="0"/>
               <a:t>Color shorthand #ABC same as #AABBCC</a:t>
             </a:r>
-            <a:endParaRPr lang="en-US" dirty="0" smtClean="0"/>
           </a:p>
           <a:p>
             <a:r>
@@ -6750,11 +6609,6 @@
               </a:rPr>
               <a:t>0</a:t>
             </a:r>
-            <a:endParaRPr lang="en-US" dirty="0" smtClean="0">
-              <a:solidFill>
-                <a:srgbClr val="00B0F0"/>
-              </a:solidFill>
-            </a:endParaRPr>
           </a:p>
           <a:p>
             <a:r>
@@ -7192,7 +7046,6 @@
               <a:rPr lang="en-US" sz="2000" dirty="0" smtClean="0"/>
               <a:t>Demo an inline style</a:t>
             </a:r>
-            <a:endParaRPr lang="en-US" sz="2000" dirty="0" smtClean="0"/>
           </a:p>
           <a:p>
             <a:pPr>
@@ -7715,10 +7568,6 @@
               <a:rPr lang="en-US" dirty="0" smtClean="0"/>
               <a:t>div and span </a:t>
             </a:r>
-            <a:r>
-              <a:rPr lang="en-US" dirty="0" smtClean="0"/>
-              <a:t/>
-            </a:r>
             <a:br>
               <a:rPr lang="en-US" dirty="0" smtClean="0"/>
             </a:br>
@@ -7812,32 +7661,47 @@
                 <a:latin typeface="Courier New" pitchFamily="49" charset="0"/>
                 <a:cs typeface="Courier New" pitchFamily="49" charset="0"/>
               </a:rPr>
-              <a:t> </a:t>
+              <a:t>    &lt;p&gt;Here are my </a:t>
             </a:r>
             <a:r>
               <a:rPr lang="en-US" sz="1900" b="1" dirty="0" smtClean="0">
-                <a:latin typeface="Courier New" pitchFamily="49" charset="0"/>
-                <a:cs typeface="Courier New" pitchFamily="49" charset="0"/>
-              </a:rPr>
-              <a:t>   &lt;p&gt;Here are my </a:t>
+                <a:solidFill>
+                  <a:srgbClr val="FF0000"/>
+                </a:solidFill>
+                <a:latin typeface="Courier New" pitchFamily="49" charset="0"/>
+                <a:cs typeface="Courier New" pitchFamily="49" charset="0"/>
+              </a:rPr>
+              <a:t>&lt;span class=“emphasis”&gt;</a:t>
             </a:r>
             <a:r>
               <a:rPr lang="en-US" sz="1900" b="1" dirty="0" smtClean="0">
+                <a:latin typeface="Courier New" pitchFamily="49" charset="0"/>
+                <a:cs typeface="Courier New" pitchFamily="49" charset="0"/>
+              </a:rPr>
+              <a:t>very important</a:t>
+            </a:r>
+            <a:r>
+              <a:rPr lang="en-US" sz="1900" b="1" dirty="0" smtClean="0">
                 <a:solidFill>
                   <a:srgbClr val="FF0000"/>
                 </a:solidFill>
                 <a:latin typeface="Courier New" pitchFamily="49" charset="0"/>
                 <a:cs typeface="Courier New" pitchFamily="49" charset="0"/>
               </a:rPr>
-              <a:t>&lt;span class=“emphasis”&gt;</a:t>
+              <a:t>&lt;/span&gt;</a:t>
             </a:r>
             <a:r>
               <a:rPr lang="en-US" sz="1900" b="1" dirty="0" smtClean="0">
                 <a:latin typeface="Courier New" pitchFamily="49" charset="0"/>
                 <a:cs typeface="Courier New" pitchFamily="49" charset="0"/>
               </a:rPr>
-              <a:t>very important</a:t>
-            </a:r>
+              <a:t>contents&lt;/p&gt;</a:t>
+            </a:r>
+          </a:p>
+          <a:p>
+            <a:pPr>
+              <a:buNone/>
+            </a:pPr>
             <a:r>
               <a:rPr lang="en-US" sz="1900" b="1" dirty="0" smtClean="0">
                 <a:solidFill>
@@ -7846,19 +7710,43 @@
                 <a:latin typeface="Courier New" pitchFamily="49" charset="0"/>
                 <a:cs typeface="Courier New" pitchFamily="49" charset="0"/>
               </a:rPr>
-              <a:t>&lt;/span&gt;</a:t>
-            </a:r>
+              <a:t>&lt;/div&gt;</a:t>
+            </a:r>
+          </a:p>
+          <a:p>
+            <a:pPr>
+              <a:buNone/>
+            </a:pPr>
             <a:r>
               <a:rPr lang="en-US" sz="1900" b="1" dirty="0" smtClean="0">
-                <a:latin typeface="Courier New" pitchFamily="49" charset="0"/>
-                <a:cs typeface="Courier New" pitchFamily="49" charset="0"/>
-              </a:rPr>
-              <a:t>contents&lt;/p&gt;</a:t>
-            </a:r>
-            <a:endParaRPr lang="en-US" sz="1900" b="1" dirty="0" smtClean="0">
-              <a:latin typeface="Courier New" pitchFamily="49" charset="0"/>
-              <a:cs typeface="Courier New" pitchFamily="49" charset="0"/>
-            </a:endParaRPr>
+                <a:solidFill>
+                  <a:srgbClr val="FF0000"/>
+                </a:solidFill>
+                <a:latin typeface="Courier New" pitchFamily="49" charset="0"/>
+                <a:cs typeface="Courier New" pitchFamily="49" charset="0"/>
+              </a:rPr>
+              <a:t>&lt;div class=“</a:t>
+            </a:r>
+            <a:r>
+              <a:rPr lang="en-US" sz="1900" b="1" dirty="0" smtClean="0">
+                <a:solidFill>
+                  <a:srgbClr val="00B0F0"/>
+                </a:solidFill>
+                <a:latin typeface="Courier New" pitchFamily="49" charset="0"/>
+                <a:cs typeface="Courier New" pitchFamily="49" charset="0"/>
+              </a:rPr>
+              <a:t>main-menu</a:t>
+            </a:r>
+            <a:r>
+              <a:rPr lang="en-US" sz="1900" b="1" dirty="0" smtClean="0">
+                <a:solidFill>
+                  <a:srgbClr val="FF0000"/>
+                </a:solidFill>
+                <a:latin typeface="Courier New" pitchFamily="49" charset="0"/>
+                <a:cs typeface="Courier New" pitchFamily="49" charset="0"/>
+              </a:rPr>
+              <a:t>”&gt;</a:t>
+            </a:r>
           </a:p>
           <a:p>
             <a:pPr>
@@ -7866,259 +7754,146 @@
             </a:pPr>
             <a:r>
               <a:rPr lang="en-US" sz="1900" b="1" dirty="0" smtClean="0">
+                <a:latin typeface="Courier New" pitchFamily="49" charset="0"/>
+                <a:cs typeface="Courier New" pitchFamily="49" charset="0"/>
+              </a:rPr>
+              <a:t>    &lt;</a:t>
+            </a:r>
+            <a:r>
+              <a:rPr lang="en-US" sz="1900" b="1" dirty="0" err="1" smtClean="0">
+                <a:latin typeface="Courier New" pitchFamily="49" charset="0"/>
+                <a:cs typeface="Courier New" pitchFamily="49" charset="0"/>
+              </a:rPr>
+              <a:t>ul</a:t>
+            </a:r>
+            <a:r>
+              <a:rPr lang="en-US" sz="1900" b="1" dirty="0" smtClean="0">
+                <a:latin typeface="Courier New" pitchFamily="49" charset="0"/>
+                <a:cs typeface="Courier New" pitchFamily="49" charset="0"/>
+              </a:rPr>
+              <a:t>&gt;</a:t>
+            </a:r>
+          </a:p>
+          <a:p>
+            <a:pPr>
+              <a:buNone/>
+            </a:pPr>
+            <a:r>
+              <a:rPr lang="en-US" sz="1900" b="1" dirty="0" smtClean="0">
+                <a:latin typeface="Courier New" pitchFamily="49" charset="0"/>
+                <a:cs typeface="Courier New" pitchFamily="49" charset="0"/>
+              </a:rPr>
+              <a:t>         &lt;</a:t>
+            </a:r>
+            <a:r>
+              <a:rPr lang="en-US" sz="1900" b="1" dirty="0" err="1" smtClean="0">
+                <a:latin typeface="Courier New" pitchFamily="49" charset="0"/>
+                <a:cs typeface="Courier New" pitchFamily="49" charset="0"/>
+              </a:rPr>
+              <a:t>li</a:t>
+            </a:r>
+            <a:r>
+              <a:rPr lang="en-US" sz="1900" b="1" dirty="0" smtClean="0">
+                <a:latin typeface="Courier New" pitchFamily="49" charset="0"/>
+                <a:cs typeface="Courier New" pitchFamily="49" charset="0"/>
+              </a:rPr>
+              <a:t>&gt;Item 1&lt;/</a:t>
+            </a:r>
+            <a:r>
+              <a:rPr lang="en-US" sz="1900" b="1" dirty="0" err="1" smtClean="0">
+                <a:latin typeface="Courier New" pitchFamily="49" charset="0"/>
+                <a:cs typeface="Courier New" pitchFamily="49" charset="0"/>
+              </a:rPr>
+              <a:t>li</a:t>
+            </a:r>
+            <a:r>
+              <a:rPr lang="en-US" sz="1900" b="1" dirty="0" smtClean="0">
+                <a:latin typeface="Courier New" pitchFamily="49" charset="0"/>
+                <a:cs typeface="Courier New" pitchFamily="49" charset="0"/>
+              </a:rPr>
+              <a:t>&gt;</a:t>
+            </a:r>
+          </a:p>
+          <a:p>
+            <a:pPr>
+              <a:buNone/>
+            </a:pPr>
+            <a:r>
+              <a:rPr lang="en-US" sz="1900" b="1" dirty="0" smtClean="0">
+                <a:latin typeface="Courier New" pitchFamily="49" charset="0"/>
+                <a:cs typeface="Courier New" pitchFamily="49" charset="0"/>
+              </a:rPr>
+              <a:t>         &lt;</a:t>
+            </a:r>
+            <a:r>
+              <a:rPr lang="en-US" sz="1900" b="1" dirty="0" err="1" smtClean="0">
+                <a:latin typeface="Courier New" pitchFamily="49" charset="0"/>
+                <a:cs typeface="Courier New" pitchFamily="49" charset="0"/>
+              </a:rPr>
+              <a:t>li</a:t>
+            </a:r>
+            <a:r>
+              <a:rPr lang="en-US" sz="1900" b="1" dirty="0" smtClean="0">
+                <a:latin typeface="Courier New" pitchFamily="49" charset="0"/>
+                <a:cs typeface="Courier New" pitchFamily="49" charset="0"/>
+              </a:rPr>
+              <a:t>&gt;Item 1&lt;/</a:t>
+            </a:r>
+            <a:r>
+              <a:rPr lang="en-US" sz="1900" b="1" dirty="0" err="1" smtClean="0">
+                <a:latin typeface="Courier New" pitchFamily="49" charset="0"/>
+                <a:cs typeface="Courier New" pitchFamily="49" charset="0"/>
+              </a:rPr>
+              <a:t>li</a:t>
+            </a:r>
+            <a:r>
+              <a:rPr lang="en-US" sz="1900" b="1" dirty="0" smtClean="0">
+                <a:latin typeface="Courier New" pitchFamily="49" charset="0"/>
+                <a:cs typeface="Courier New" pitchFamily="49" charset="0"/>
+              </a:rPr>
+              <a:t>&gt;</a:t>
+            </a:r>
+          </a:p>
+          <a:p>
+            <a:pPr>
+              <a:buNone/>
+            </a:pPr>
+            <a:r>
+              <a:rPr lang="en-US" sz="1900" b="1" dirty="0" smtClean="0">
+                <a:latin typeface="Courier New" pitchFamily="49" charset="0"/>
+                <a:cs typeface="Courier New" pitchFamily="49" charset="0"/>
+              </a:rPr>
+              <a:t>    &lt;/</a:t>
+            </a:r>
+            <a:r>
+              <a:rPr lang="en-US" sz="1900" b="1" dirty="0" err="1" smtClean="0">
+                <a:latin typeface="Courier New" pitchFamily="49" charset="0"/>
+                <a:cs typeface="Courier New" pitchFamily="49" charset="0"/>
+              </a:rPr>
+              <a:t>ul</a:t>
+            </a:r>
+            <a:r>
+              <a:rPr lang="en-US" sz="1900" b="1" dirty="0" smtClean="0">
+                <a:latin typeface="Courier New" pitchFamily="49" charset="0"/>
+                <a:cs typeface="Courier New" pitchFamily="49" charset="0"/>
+              </a:rPr>
+              <a:t>&gt;</a:t>
+            </a:r>
+          </a:p>
+          <a:p>
+            <a:pPr>
+              <a:buNone/>
+            </a:pPr>
+            <a:r>
+              <a:rPr lang="en-US" sz="1900" b="1" dirty="0" smtClean="0">
                 <a:solidFill>
                   <a:srgbClr val="FF0000"/>
                 </a:solidFill>
                 <a:latin typeface="Courier New" pitchFamily="49" charset="0"/>
                 <a:cs typeface="Courier New" pitchFamily="49" charset="0"/>
               </a:rPr>
-              <a:t>&lt;/div&gt;</a:t>
-            </a:r>
-            <a:endParaRPr lang="en-US" sz="1900" b="1" dirty="0" smtClean="0">
-              <a:solidFill>
-                <a:srgbClr val="FF0000"/>
-              </a:solidFill>
-              <a:latin typeface="Courier New" pitchFamily="49" charset="0"/>
-              <a:cs typeface="Courier New" pitchFamily="49" charset="0"/>
-            </a:endParaRPr>
-          </a:p>
-          <a:p>
-            <a:pPr>
-              <a:buNone/>
-            </a:pPr>
-            <a:r>
-              <a:rPr lang="en-US" sz="1900" b="1" dirty="0" smtClean="0">
-                <a:solidFill>
-                  <a:srgbClr val="FF0000"/>
-                </a:solidFill>
-                <a:latin typeface="Courier New" pitchFamily="49" charset="0"/>
-                <a:cs typeface="Courier New" pitchFamily="49" charset="0"/>
-              </a:rPr>
-              <a:t>&lt;div class</a:t>
-            </a:r>
-            <a:r>
-              <a:rPr lang="en-US" sz="1900" b="1" dirty="0" smtClean="0">
-                <a:solidFill>
-                  <a:srgbClr val="FF0000"/>
-                </a:solidFill>
-                <a:latin typeface="Courier New" pitchFamily="49" charset="0"/>
-                <a:cs typeface="Courier New" pitchFamily="49" charset="0"/>
-              </a:rPr>
-              <a:t>=“</a:t>
-            </a:r>
-            <a:r>
-              <a:rPr lang="en-US" sz="1900" b="1" dirty="0" smtClean="0">
-                <a:solidFill>
-                  <a:srgbClr val="00B0F0"/>
-                </a:solidFill>
-                <a:latin typeface="Courier New" pitchFamily="49" charset="0"/>
-                <a:cs typeface="Courier New" pitchFamily="49" charset="0"/>
-              </a:rPr>
-              <a:t>main-menu</a:t>
-            </a:r>
-            <a:r>
-              <a:rPr lang="en-US" sz="1900" b="1" dirty="0" smtClean="0">
-                <a:solidFill>
-                  <a:srgbClr val="FF0000"/>
-                </a:solidFill>
-                <a:latin typeface="Courier New" pitchFamily="49" charset="0"/>
-                <a:cs typeface="Courier New" pitchFamily="49" charset="0"/>
-              </a:rPr>
-              <a:t>”&gt;</a:t>
-            </a:r>
-            <a:endParaRPr lang="en-US" sz="1900" b="1" dirty="0" smtClean="0">
-              <a:solidFill>
-                <a:srgbClr val="FF0000"/>
-              </a:solidFill>
-              <a:latin typeface="Courier New" pitchFamily="49" charset="0"/>
-              <a:cs typeface="Courier New" pitchFamily="49" charset="0"/>
-            </a:endParaRPr>
-          </a:p>
-          <a:p>
-            <a:pPr>
-              <a:buNone/>
-            </a:pPr>
-            <a:r>
-              <a:rPr lang="en-US" sz="1900" b="1" dirty="0" smtClean="0">
-                <a:latin typeface="Courier New" pitchFamily="49" charset="0"/>
-                <a:cs typeface="Courier New" pitchFamily="49" charset="0"/>
-              </a:rPr>
-              <a:t>    </a:t>
-            </a:r>
-            <a:r>
-              <a:rPr lang="en-US" sz="1900" b="1" dirty="0" smtClean="0">
-                <a:latin typeface="Courier New" pitchFamily="49" charset="0"/>
-                <a:cs typeface="Courier New" pitchFamily="49" charset="0"/>
-              </a:rPr>
-              <a:t>&lt;</a:t>
-            </a:r>
-            <a:r>
-              <a:rPr lang="en-US" sz="1900" b="1" dirty="0" err="1" smtClean="0">
-                <a:latin typeface="Courier New" pitchFamily="49" charset="0"/>
-                <a:cs typeface="Courier New" pitchFamily="49" charset="0"/>
-              </a:rPr>
-              <a:t>ul</a:t>
-            </a:r>
-            <a:r>
-              <a:rPr lang="en-US" sz="1900" b="1" dirty="0" smtClean="0">
-                <a:latin typeface="Courier New" pitchFamily="49" charset="0"/>
-                <a:cs typeface="Courier New" pitchFamily="49" charset="0"/>
-              </a:rPr>
-              <a:t>&gt;</a:t>
-            </a:r>
-          </a:p>
-          <a:p>
-            <a:pPr>
-              <a:buNone/>
-            </a:pPr>
-            <a:r>
-              <a:rPr lang="en-US" sz="1900" b="1" dirty="0" smtClean="0">
-                <a:latin typeface="Courier New" pitchFamily="49" charset="0"/>
-                <a:cs typeface="Courier New" pitchFamily="49" charset="0"/>
-              </a:rPr>
-              <a:t> </a:t>
-            </a:r>
-            <a:r>
-              <a:rPr lang="en-US" sz="1900" b="1" dirty="0" smtClean="0">
-                <a:latin typeface="Courier New" pitchFamily="49" charset="0"/>
-                <a:cs typeface="Courier New" pitchFamily="49" charset="0"/>
-              </a:rPr>
-              <a:t>        &lt;</a:t>
-            </a:r>
-            <a:r>
-              <a:rPr lang="en-US" sz="1900" b="1" dirty="0" err="1" smtClean="0">
-                <a:latin typeface="Courier New" pitchFamily="49" charset="0"/>
-                <a:cs typeface="Courier New" pitchFamily="49" charset="0"/>
-              </a:rPr>
-              <a:t>li</a:t>
-            </a:r>
-            <a:r>
-              <a:rPr lang="en-US" sz="1900" b="1" dirty="0" smtClean="0">
-                <a:latin typeface="Courier New" pitchFamily="49" charset="0"/>
-                <a:cs typeface="Courier New" pitchFamily="49" charset="0"/>
-              </a:rPr>
-              <a:t>&gt;Item 1&lt;/</a:t>
-            </a:r>
-            <a:r>
-              <a:rPr lang="en-US" sz="1900" b="1" dirty="0" err="1" smtClean="0">
-                <a:latin typeface="Courier New" pitchFamily="49" charset="0"/>
-                <a:cs typeface="Courier New" pitchFamily="49" charset="0"/>
-              </a:rPr>
-              <a:t>li</a:t>
-            </a:r>
-            <a:r>
-              <a:rPr lang="en-US" sz="1900" b="1" dirty="0" smtClean="0">
-                <a:latin typeface="Courier New" pitchFamily="49" charset="0"/>
-                <a:cs typeface="Courier New" pitchFamily="49" charset="0"/>
-              </a:rPr>
-              <a:t>&gt;</a:t>
-            </a:r>
-          </a:p>
-          <a:p>
-            <a:pPr>
-              <a:buNone/>
-            </a:pPr>
-            <a:r>
-              <a:rPr lang="en-US" sz="1900" b="1" dirty="0" smtClean="0">
-                <a:latin typeface="Courier New" pitchFamily="49" charset="0"/>
-                <a:cs typeface="Courier New" pitchFamily="49" charset="0"/>
-              </a:rPr>
-              <a:t> </a:t>
-            </a:r>
-            <a:r>
-              <a:rPr lang="en-US" sz="1900" b="1" dirty="0" smtClean="0">
-                <a:latin typeface="Courier New" pitchFamily="49" charset="0"/>
-                <a:cs typeface="Courier New" pitchFamily="49" charset="0"/>
-              </a:rPr>
-              <a:t>        &lt;</a:t>
-            </a:r>
-            <a:r>
-              <a:rPr lang="en-US" sz="1900" b="1" dirty="0" err="1" smtClean="0">
-                <a:latin typeface="Courier New" pitchFamily="49" charset="0"/>
-                <a:cs typeface="Courier New" pitchFamily="49" charset="0"/>
-              </a:rPr>
-              <a:t>li</a:t>
-            </a:r>
-            <a:r>
-              <a:rPr lang="en-US" sz="1900" b="1" dirty="0" smtClean="0">
-                <a:latin typeface="Courier New" pitchFamily="49" charset="0"/>
-                <a:cs typeface="Courier New" pitchFamily="49" charset="0"/>
-              </a:rPr>
-              <a:t>&gt;Item 1&lt;/</a:t>
-            </a:r>
-            <a:r>
-              <a:rPr lang="en-US" sz="1900" b="1" dirty="0" err="1" smtClean="0">
-                <a:latin typeface="Courier New" pitchFamily="49" charset="0"/>
-                <a:cs typeface="Courier New" pitchFamily="49" charset="0"/>
-              </a:rPr>
-              <a:t>li</a:t>
-            </a:r>
-            <a:r>
-              <a:rPr lang="en-US" sz="1900" b="1" dirty="0" smtClean="0">
-                <a:latin typeface="Courier New" pitchFamily="49" charset="0"/>
-                <a:cs typeface="Courier New" pitchFamily="49" charset="0"/>
-              </a:rPr>
-              <a:t>&gt;</a:t>
-            </a:r>
-            <a:endParaRPr lang="en-US" sz="1900" b="1" dirty="0" smtClean="0">
-              <a:latin typeface="Courier New" pitchFamily="49" charset="0"/>
-              <a:cs typeface="Courier New" pitchFamily="49" charset="0"/>
-            </a:endParaRPr>
-          </a:p>
-          <a:p>
-            <a:pPr>
-              <a:buNone/>
-            </a:pPr>
-            <a:r>
-              <a:rPr lang="en-US" sz="1900" b="1" dirty="0" smtClean="0">
-                <a:latin typeface="Courier New" pitchFamily="49" charset="0"/>
-                <a:cs typeface="Courier New" pitchFamily="49" charset="0"/>
-              </a:rPr>
-              <a:t> </a:t>
-            </a:r>
-            <a:r>
-              <a:rPr lang="en-US" sz="1900" b="1" dirty="0" smtClean="0">
-                <a:latin typeface="Courier New" pitchFamily="49" charset="0"/>
-                <a:cs typeface="Courier New" pitchFamily="49" charset="0"/>
-              </a:rPr>
-              <a:t>   &lt;/</a:t>
-            </a:r>
-            <a:r>
-              <a:rPr lang="en-US" sz="1900" b="1" dirty="0" err="1" smtClean="0">
-                <a:latin typeface="Courier New" pitchFamily="49" charset="0"/>
-                <a:cs typeface="Courier New" pitchFamily="49" charset="0"/>
-              </a:rPr>
-              <a:t>ul</a:t>
-            </a:r>
-            <a:r>
-              <a:rPr lang="en-US" sz="1900" b="1" dirty="0" smtClean="0">
-                <a:latin typeface="Courier New" pitchFamily="49" charset="0"/>
-                <a:cs typeface="Courier New" pitchFamily="49" charset="0"/>
-              </a:rPr>
-              <a:t>&gt;</a:t>
-            </a:r>
-          </a:p>
-          <a:p>
-            <a:pPr>
-              <a:buNone/>
-            </a:pPr>
-            <a:r>
-              <a:rPr lang="en-US" sz="1900" b="1" dirty="0" smtClean="0">
-                <a:solidFill>
-                  <a:srgbClr val="FF0000"/>
-                </a:solidFill>
-                <a:latin typeface="Courier New" pitchFamily="49" charset="0"/>
-                <a:cs typeface="Courier New" pitchFamily="49" charset="0"/>
-              </a:rPr>
               <a:t>&lt;div/&gt;</a:t>
             </a:r>
-            <a:endParaRPr lang="en-US" sz="1900" b="1" dirty="0" smtClean="0">
-              <a:solidFill>
-                <a:srgbClr val="FF0000"/>
-              </a:solidFill>
-              <a:latin typeface="Courier New" pitchFamily="49" charset="0"/>
-              <a:cs typeface="Courier New" pitchFamily="49" charset="0"/>
-            </a:endParaRPr>
           </a:p>
           <a:p>
             <a:pPr>
@@ -8524,13 +8299,7 @@
               <a:rPr lang="en-US" sz="2400" dirty="0" smtClean="0">
                 <a:hlinkClick r:id="rId2"/>
               </a:rPr>
-              <a:t>http://</a:t>
-            </a:r>
-            <a:r>
-              <a:rPr lang="en-US" sz="2400" dirty="0" smtClean="0">
-                <a:hlinkClick r:id="rId2"/>
-              </a:rPr>
-              <a:t>www.w3schools.com</a:t>
+              <a:t>http://www.w3schools.com</a:t>
             </a:r>
             <a:endParaRPr lang="en-US" sz="2400" dirty="0" smtClean="0"/>
           </a:p>
@@ -8558,7 +8327,6 @@
               <a:rPr lang="en-US" sz="2400" dirty="0" smtClean="0"/>
               <a:t>Questions</a:t>
             </a:r>
-            <a:endParaRPr lang="en-US" sz="2400" dirty="0" smtClean="0"/>
           </a:p>
           <a:p>
             <a:pPr>
@@ -8870,7 +8638,6 @@
               <a:rPr lang="en-US" dirty="0" smtClean="0"/>
               <a:t>Sets the layout of the document</a:t>
             </a:r>
-            <a:endParaRPr lang="en-US" dirty="0" smtClean="0"/>
           </a:p>
           <a:p>
             <a:pPr lvl="1"/>
@@ -9266,7 +9033,6 @@
               <a:rPr lang="en-US" dirty="0" smtClean="0"/>
               <a:t>First External</a:t>
             </a:r>
-            <a:endParaRPr lang="en-US" dirty="0" smtClean="0"/>
           </a:p>
         </p:txBody>
       </p:sp>
@@ -9433,8 +9199,30 @@
                 <a:latin typeface="Courier New" pitchFamily="49" charset="0"/>
                 <a:cs typeface="Courier New" pitchFamily="49" charset="0"/>
               </a:rPr>
-              <a:t> </a:t>
-            </a:r>
+              <a:t>        </a:t>
+            </a:r>
+            <a:r>
+              <a:rPr lang="en-US" sz="1500" b="1" dirty="0" smtClean="0">
+                <a:solidFill>
+                  <a:srgbClr val="0070C0"/>
+                </a:solidFill>
+                <a:latin typeface="Courier New" pitchFamily="49" charset="0"/>
+                <a:cs typeface="Courier New" pitchFamily="49" charset="0"/>
+              </a:rPr>
+              <a:t>color</a:t>
+            </a:r>
+            <a:r>
+              <a:rPr lang="en-US" sz="1500" b="1" dirty="0" smtClean="0">
+                <a:latin typeface="Courier New" pitchFamily="49" charset="0"/>
+                <a:cs typeface="Courier New" pitchFamily="49" charset="0"/>
+              </a:rPr>
+              <a:t>: #0000FF;</a:t>
+            </a:r>
+          </a:p>
+          <a:p>
+            <a:pPr>
+              <a:buNone/>
+            </a:pPr>
             <a:r>
               <a:rPr lang="en-US" sz="1500" b="1" dirty="0" smtClean="0">
                 <a:solidFill>
@@ -9446,24 +9234,7 @@
                 <a:latin typeface="Courier New" pitchFamily="49" charset="0"/>
                 <a:cs typeface="Courier New" pitchFamily="49" charset="0"/>
               </a:rPr>
-              <a:t>       </a:t>
-            </a:r>
-            <a:r>
-              <a:rPr lang="en-US" sz="1500" b="1" dirty="0" smtClean="0">
-                <a:solidFill>
-                  <a:srgbClr val="0070C0"/>
-                </a:solidFill>
-                <a:latin typeface="Courier New" pitchFamily="49" charset="0"/>
-                <a:cs typeface="Courier New" pitchFamily="49" charset="0"/>
-              </a:rPr>
-              <a:t>color</a:t>
-            </a:r>
-            <a:r>
-              <a:rPr lang="en-US" sz="1500" b="1" dirty="0" smtClean="0">
-                <a:latin typeface="Courier New" pitchFamily="49" charset="0"/>
-                <a:cs typeface="Courier New" pitchFamily="49" charset="0"/>
-              </a:rPr>
-              <a:t>: #0000FF;</a:t>
+              <a:t>     }</a:t>
             </a:r>
           </a:p>
           <a:p>
@@ -9481,7 +9252,65 @@
                 <a:latin typeface="Courier New" pitchFamily="49" charset="0"/>
                 <a:cs typeface="Courier New" pitchFamily="49" charset="0"/>
               </a:rPr>
-              <a:t>     }</a:t>
+              <a:t>     p{</a:t>
+            </a:r>
+          </a:p>
+          <a:p>
+            <a:pPr>
+              <a:buNone/>
+            </a:pPr>
+            <a:r>
+              <a:rPr lang="en-US" sz="1500" b="1" dirty="0" smtClean="0">
+                <a:latin typeface="Courier New" pitchFamily="49" charset="0"/>
+                <a:cs typeface="Courier New" pitchFamily="49" charset="0"/>
+              </a:rPr>
+              <a:t>           </a:t>
+            </a:r>
+            <a:r>
+              <a:rPr lang="en-US" sz="1500" b="1" dirty="0" smtClean="0">
+                <a:solidFill>
+                  <a:srgbClr val="0070C0"/>
+                </a:solidFill>
+                <a:latin typeface="Courier New" pitchFamily="49" charset="0"/>
+                <a:cs typeface="Courier New" pitchFamily="49" charset="0"/>
+              </a:rPr>
+              <a:t>color</a:t>
+            </a:r>
+            <a:r>
+              <a:rPr lang="en-US" sz="1500" b="1" dirty="0" smtClean="0">
+                <a:latin typeface="Courier New" pitchFamily="49" charset="0"/>
+                <a:cs typeface="Courier New" pitchFamily="49" charset="0"/>
+              </a:rPr>
+              <a:t>: #FF0000; </a:t>
+            </a:r>
+          </a:p>
+          <a:p>
+            <a:pPr>
+              <a:buNone/>
+            </a:pPr>
+            <a:r>
+              <a:rPr lang="en-US" sz="1500" b="1" dirty="0" smtClean="0">
+                <a:latin typeface="Courier New" pitchFamily="49" charset="0"/>
+                <a:cs typeface="Courier New" pitchFamily="49" charset="0"/>
+              </a:rPr>
+              <a:t>           </a:t>
+            </a:r>
+            <a:r>
+              <a:rPr lang="en-US" sz="1500" b="1" dirty="0" smtClean="0">
+                <a:solidFill>
+                  <a:srgbClr val="0070C0"/>
+                </a:solidFill>
+                <a:latin typeface="Courier New" pitchFamily="49" charset="0"/>
+                <a:cs typeface="Courier New" pitchFamily="49" charset="0"/>
+              </a:rPr>
+              <a:t>font</a:t>
+            </a:r>
+            <a:r>
+              <a:rPr lang="en-US" sz="1500" b="1" dirty="0" smtClean="0">
+                <a:latin typeface="Courier New" pitchFamily="49" charset="0"/>
+                <a:cs typeface="Courier New" pitchFamily="49" charset="0"/>
+              </a:rPr>
+              <a:t>: “Arial”; </a:t>
             </a:r>
           </a:p>
           <a:p>
@@ -9499,7 +9328,7 @@
                 <a:latin typeface="Courier New" pitchFamily="49" charset="0"/>
                 <a:cs typeface="Courier New" pitchFamily="49" charset="0"/>
               </a:rPr>
-              <a:t>     p{</a:t>
+              <a:t>     }</a:t>
             </a:r>
           </a:p>
           <a:p>
@@ -9508,63 +9337,13 @@
             </a:pPr>
             <a:r>
               <a:rPr lang="en-US" sz="1500" b="1" dirty="0" smtClean="0">
-                <a:latin typeface="Courier New" pitchFamily="49" charset="0"/>
-                <a:cs typeface="Courier New" pitchFamily="49" charset="0"/>
-              </a:rPr>
-              <a:t>           </a:t>
-            </a:r>
-            <a:r>
-              <a:rPr lang="en-US" sz="1500" b="1" dirty="0" smtClean="0">
-                <a:solidFill>
-                  <a:srgbClr val="0070C0"/>
-                </a:solidFill>
-                <a:latin typeface="Courier New" pitchFamily="49" charset="0"/>
-                <a:cs typeface="Courier New" pitchFamily="49" charset="0"/>
-              </a:rPr>
-              <a:t>color</a:t>
-            </a:r>
-            <a:r>
-              <a:rPr lang="en-US" sz="1500" b="1" dirty="0" smtClean="0">
-                <a:latin typeface="Courier New" pitchFamily="49" charset="0"/>
-                <a:cs typeface="Courier New" pitchFamily="49" charset="0"/>
-              </a:rPr>
-              <a:t>: #FF0000; </a:t>
-            </a:r>
-          </a:p>
-          <a:p>
-            <a:pPr>
-              <a:buNone/>
-            </a:pPr>
-            <a:r>
-              <a:rPr lang="en-US" sz="1500" b="1" dirty="0" smtClean="0">
-                <a:latin typeface="Courier New" pitchFamily="49" charset="0"/>
-                <a:cs typeface="Courier New" pitchFamily="49" charset="0"/>
-              </a:rPr>
-              <a:t> </a:t>
-            </a:r>
-            <a:r>
-              <a:rPr lang="en-US" sz="1500" b="1" dirty="0" smtClean="0">
-                <a:latin typeface="Courier New" pitchFamily="49" charset="0"/>
-                <a:cs typeface="Courier New" pitchFamily="49" charset="0"/>
-              </a:rPr>
-              <a:t>          </a:t>
-            </a:r>
-            <a:r>
-              <a:rPr lang="en-US" sz="1500" b="1" dirty="0" smtClean="0">
-                <a:solidFill>
-                  <a:srgbClr val="0070C0"/>
-                </a:solidFill>
-                <a:latin typeface="Courier New" pitchFamily="49" charset="0"/>
-                <a:cs typeface="Courier New" pitchFamily="49" charset="0"/>
-              </a:rPr>
-              <a:t>font</a:t>
-            </a:r>
-            <a:r>
-              <a:rPr lang="en-US" sz="1500" b="1" dirty="0" smtClean="0">
-                <a:latin typeface="Courier New" pitchFamily="49" charset="0"/>
-                <a:cs typeface="Courier New" pitchFamily="49" charset="0"/>
-              </a:rPr>
-              <a:t>: “Arial”; </a:t>
+                <a:solidFill>
+                  <a:srgbClr val="FF0000"/>
+                </a:solidFill>
+                <a:latin typeface="Courier New" pitchFamily="49" charset="0"/>
+                <a:cs typeface="Courier New" pitchFamily="49" charset="0"/>
+              </a:rPr>
+              <a:t>&lt;/style&gt;</a:t>
             </a:r>
           </a:p>
           <a:p>
@@ -9582,20 +9361,19 @@
                 <a:latin typeface="Courier New" pitchFamily="49" charset="0"/>
                 <a:cs typeface="Courier New" pitchFamily="49" charset="0"/>
               </a:rPr>
-              <a:t> </a:t>
-            </a:r>
+              <a:t>….</a:t>
+            </a:r>
+          </a:p>
+          <a:p>
+            <a:pPr>
+              <a:buNone/>
+            </a:pPr>
             <a:r>
               <a:rPr lang="en-US" sz="1500" b="1" dirty="0" smtClean="0">
-                <a:solidFill>
-                  <a:schemeClr val="tx2">
-                    <a:lumMod val="60000"/>
-                    <a:lumOff val="40000"/>
-                  </a:schemeClr>
-                </a:solidFill>
-                <a:latin typeface="Courier New" pitchFamily="49" charset="0"/>
-                <a:cs typeface="Courier New" pitchFamily="49" charset="0"/>
-              </a:rPr>
-              <a:t>    }</a:t>
+                <a:latin typeface="Courier New" pitchFamily="49" charset="0"/>
+                <a:cs typeface="Courier New" pitchFamily="49" charset="0"/>
+              </a:rPr>
+              <a:t>&lt;p&gt;</a:t>
             </a:r>
           </a:p>
           <a:p>
@@ -9604,67 +9382,11 @@
             </a:pPr>
             <a:r>
               <a:rPr lang="en-US" sz="1500" b="1" dirty="0" smtClean="0">
-                <a:solidFill>
-                  <a:srgbClr val="FF0000"/>
-                </a:solidFill>
-                <a:latin typeface="Courier New" pitchFamily="49" charset="0"/>
-                <a:cs typeface="Courier New" pitchFamily="49" charset="0"/>
-              </a:rPr>
-              <a:t>&lt;/style&gt;</a:t>
-            </a:r>
-          </a:p>
-          <a:p>
-            <a:pPr>
-              <a:buNone/>
-            </a:pPr>
-            <a:r>
-              <a:rPr lang="en-US" sz="1500" b="1" dirty="0" smtClean="0">
-                <a:solidFill>
-                  <a:schemeClr val="tx2">
-                    <a:lumMod val="60000"/>
-                    <a:lumOff val="40000"/>
-                  </a:schemeClr>
-                </a:solidFill>
-                <a:latin typeface="Courier New" pitchFamily="49" charset="0"/>
-                <a:cs typeface="Courier New" pitchFamily="49" charset="0"/>
-              </a:rPr>
-              <a:t>….</a:t>
-            </a:r>
-          </a:p>
-          <a:p>
-            <a:pPr>
-              <a:buNone/>
-            </a:pPr>
-            <a:r>
-              <a:rPr lang="en-US" sz="1500" b="1" dirty="0" smtClean="0">
-                <a:latin typeface="Courier New" pitchFamily="49" charset="0"/>
-                <a:cs typeface="Courier New" pitchFamily="49" charset="0"/>
-              </a:rPr>
-              <a:t>&lt;p&gt;</a:t>
-            </a:r>
-          </a:p>
-          <a:p>
-            <a:pPr>
-              <a:buNone/>
-            </a:pPr>
-            <a:r>
-              <a:rPr lang="en-US" sz="1500" b="1" dirty="0" smtClean="0">
-                <a:latin typeface="Courier New" pitchFamily="49" charset="0"/>
-                <a:cs typeface="Courier New" pitchFamily="49" charset="0"/>
-              </a:rPr>
-              <a:t> </a:t>
-            </a:r>
-            <a:r>
-              <a:rPr lang="en-US" sz="1500" b="1" dirty="0" smtClean="0">
-                <a:latin typeface="Courier New" pitchFamily="49" charset="0"/>
-                <a:cs typeface="Courier New" pitchFamily="49" charset="0"/>
-              </a:rPr>
-              <a:t>   This is a simple CSS demo</a:t>
-            </a:r>
-            <a:endParaRPr lang="en-US" sz="1500" b="1" dirty="0" smtClean="0">
-              <a:latin typeface="Courier New" pitchFamily="49" charset="0"/>
-              <a:cs typeface="Courier New" pitchFamily="49" charset="0"/>
-            </a:endParaRPr>
+                <a:latin typeface="Courier New" pitchFamily="49" charset="0"/>
+                <a:cs typeface="Courier New" pitchFamily="49" charset="0"/>
+              </a:rPr>
+              <a:t>    This is a simple CSS demo</a:t>
+            </a:r>
           </a:p>
           <a:p>
             <a:pPr>

</xml_diff>

<commit_message>
added the fourth set of slides
</commit_message>
<xml_diff>
--- a/Intro to Web Development Part 3 CSS.pptx
+++ b/Intro to Web Development Part 3 CSS.pptx
@@ -218,7 +218,7 @@
             <a:fld id="{D1D57645-FFCD-449A-BB23-5EA1509828F4}" type="datetimeFigureOut">
               <a:rPr lang="en-US" smtClean="0"/>
               <a:pPr/>
-              <a:t>7/3/2012</a:t>
+              <a:t>7/5/2012</a:t>
             </a:fld>
             <a:endParaRPr lang="en-US"/>
           </a:p>
@@ -380,7 +380,7 @@
             <a:fld id="{3DBF5F01-9883-438B-B6D0-73DBD5B9823F}" type="datetimeFigureOut">
               <a:rPr lang="en-US" smtClean="0"/>
               <a:pPr/>
-              <a:t>7/3/2012</a:t>
+              <a:t>7/5/2012</a:t>
             </a:fld>
             <a:endParaRPr lang="en-US"/>
           </a:p>
@@ -781,7 +781,7 @@
             <a:fld id="{A57BAD35-6B84-4191-B3DC-7A403A6A0CC3}" type="datetime1">
               <a:rPr lang="en-US" smtClean="0"/>
               <a:pPr/>
-              <a:t>7/3/2012</a:t>
+              <a:t>7/5/2012</a:t>
             </a:fld>
             <a:endParaRPr lang="en-US"/>
           </a:p>
@@ -1096,7 +1096,7 @@
             <a:fld id="{3A050941-FA83-4211-A590-AC0CE56A8764}" type="datetime1">
               <a:rPr lang="en-US" smtClean="0"/>
               <a:pPr/>
-              <a:t>7/3/2012</a:t>
+              <a:t>7/5/2012</a:t>
             </a:fld>
             <a:endParaRPr lang="en-US"/>
           </a:p>
@@ -1283,7 +1283,7 @@
             <a:fld id="{FEE52DFA-80C0-47DB-9BD9-1D65CB6CDA24}" type="datetime1">
               <a:rPr lang="en-US" smtClean="0"/>
               <a:pPr/>
-              <a:t>7/3/2012</a:t>
+              <a:t>7/5/2012</a:t>
             </a:fld>
             <a:endParaRPr lang="en-US"/>
           </a:p>
@@ -1460,7 +1460,7 @@
             <a:fld id="{C2F50358-D16D-4C1E-B4FA-5684242D23EC}" type="datetime1">
               <a:rPr lang="en-US" smtClean="0"/>
               <a:pPr/>
-              <a:t>7/3/2012</a:t>
+              <a:t>7/5/2012</a:t>
             </a:fld>
             <a:endParaRPr lang="en-US"/>
           </a:p>
@@ -1730,7 +1730,7 @@
             <a:fld id="{CBDDB5AB-3AEE-44CE-9007-9F1799B280DC}" type="datetime1">
               <a:rPr lang="en-US" smtClean="0"/>
               <a:pPr/>
-              <a:t>7/3/2012</a:t>
+              <a:t>7/5/2012</a:t>
             </a:fld>
             <a:endParaRPr lang="en-US"/>
           </a:p>
@@ -2200,7 +2200,7 @@
             <a:fld id="{D3203901-A8D7-4787-8A59-7548459B0167}" type="datetime1">
               <a:rPr lang="en-US" smtClean="0"/>
               <a:pPr/>
-              <a:t>7/3/2012</a:t>
+              <a:t>7/5/2012</a:t>
             </a:fld>
             <a:endParaRPr lang="en-US"/>
           </a:p>
@@ -2691,7 +2691,7 @@
             <a:fld id="{7918E94E-D541-420D-A800-FD77FBF7DA22}" type="datetime1">
               <a:rPr lang="en-US" smtClean="0"/>
               <a:pPr/>
-              <a:t>7/3/2012</a:t>
+              <a:t>7/5/2012</a:t>
             </a:fld>
             <a:endParaRPr lang="en-US"/>
           </a:p>
@@ -2819,7 +2819,7 @@
             <a:fld id="{4F6AD9DB-6294-4080-B799-E3AAD55EC433}" type="datetime1">
               <a:rPr lang="en-US" smtClean="0"/>
               <a:pPr/>
-              <a:t>7/3/2012</a:t>
+              <a:t>7/5/2012</a:t>
             </a:fld>
             <a:endParaRPr lang="en-US"/>
           </a:p>
@@ -2965,7 +2965,7 @@
             <a:fld id="{BB50B515-1A03-4B7B-9677-075026F277E2}" type="datetime1">
               <a:rPr lang="en-US" smtClean="0"/>
               <a:pPr/>
-              <a:t>7/3/2012</a:t>
+              <a:t>7/5/2012</a:t>
             </a:fld>
             <a:endParaRPr lang="en-US"/>
           </a:p>
@@ -3289,7 +3289,7 @@
             <a:fld id="{BB176034-9467-42CE-BFB4-763887316EF3}" type="datetime1">
               <a:rPr lang="en-US" smtClean="0"/>
               <a:pPr/>
-              <a:t>7/3/2012</a:t>
+              <a:t>7/5/2012</a:t>
             </a:fld>
             <a:endParaRPr lang="en-US"/>
           </a:p>
@@ -3425,7 +3425,7 @@
             <a:fld id="{49E44895-E262-425D-912F-9A1492637C2E}" type="datetime1">
               <a:rPr lang="en-US" smtClean="0"/>
               <a:pPr/>
-              <a:t>7/3/2012</a:t>
+              <a:t>7/5/2012</a:t>
             </a:fld>
             <a:endParaRPr lang="en-US"/>
           </a:p>
@@ -4208,7 +4208,7 @@
             <a:fld id="{23F403FB-53A5-4106-8144-8A9C4E2CDCDB}" type="datetime1">
               <a:rPr lang="en-US" smtClean="0"/>
               <a:pPr/>
-              <a:t>7/3/2012</a:t>
+              <a:t>7/5/2012</a:t>
             </a:fld>
             <a:endParaRPr lang="en-US"/>
           </a:p>
@@ -5141,7 +5141,27 @@
                 <a:latin typeface="Courier New" pitchFamily="49" charset="0"/>
                 <a:cs typeface="Courier New" pitchFamily="49" charset="0"/>
               </a:rPr>
-              <a:t>                font: "Arial"; </a:t>
+              <a:t>                </a:t>
+            </a:r>
+            <a:r>
+              <a:rPr lang="en-US" sz="1600" dirty="0" smtClean="0">
+                <a:solidFill>
+                  <a:srgbClr val="7030A0"/>
+                </a:solidFill>
+                <a:latin typeface="Courier New" pitchFamily="49" charset="0"/>
+                <a:cs typeface="Courier New" pitchFamily="49" charset="0"/>
+              </a:rPr>
+              <a:t>font-family: </a:t>
+            </a:r>
+            <a:r>
+              <a:rPr lang="en-US" sz="1600" dirty="0" smtClean="0">
+                <a:solidFill>
+                  <a:srgbClr val="7030A0"/>
+                </a:solidFill>
+                <a:latin typeface="Courier New" pitchFamily="49" charset="0"/>
+                <a:cs typeface="Courier New" pitchFamily="49" charset="0"/>
+              </a:rPr>
+              <a:t>"Arial"; </a:t>
             </a:r>
           </a:p>
           <a:p>
@@ -6412,15 +6432,7 @@
           <a:p>
             <a:r>
               <a:rPr lang="en-US" dirty="0" smtClean="0"/>
-              <a:t>Each group of two characters represents the </a:t>
-            </a:r>
-            <a:r>
-              <a:rPr lang="en-US" dirty="0" smtClean="0"/>
-              <a:t>colors </a:t>
-            </a:r>
-            <a:r>
-              <a:rPr lang="en-US" dirty="0" smtClean="0"/>
-              <a:t>Red, Green, Blue(RGB) respectively</a:t>
+              <a:t>Each group of two characters represents the colors Red, Green, Blue(RGB) respectively</a:t>
             </a:r>
           </a:p>
           <a:p>
@@ -7245,6 +7257,13 @@
   <p:clrMapOvr>
     <a:masterClrMapping/>
   </p:clrMapOvr>
+  <p:timing>
+    <p:tnLst>
+      <p:par>
+        <p:cTn id="1" dur="indefinite" restart="never" nodeType="tmRoot"/>
+      </p:par>
+    </p:tnLst>
+  </p:timing>
 </p:sld>
 </file>
 
@@ -7363,6 +7382,13 @@
   <p:clrMapOvr>
     <a:masterClrMapping/>
   </p:clrMapOvr>
+  <p:timing>
+    <p:tnLst>
+      <p:par>
+        <p:cTn id="1" dur="indefinite" restart="never" nodeType="tmRoot"/>
+      </p:par>
+    </p:tnLst>
+  </p:timing>
 </p:sld>
 </file>
 

</xml_diff>